<commit_message>
minor changes to presentation powerpoint
</commit_message>
<xml_diff>
--- a/documentation/presentation.pptx
+++ b/documentation/presentation.pptx
@@ -1589,7 +1589,7 @@
         </p:nvSpPr>
         <p:spPr>
           <a:xfrm>
-            <a:off x="381300" y="685800"/>
+            <a:off x="381000" y="685800"/>
             <a:ext cx="6096000" cy="3429000"/>
           </a:xfrm>
           <a:custGeom>
@@ -7553,7 +7553,7 @@
         </p:spPr>
         <p:txBody>
           <a:bodyPr spcFirstLastPara="1" wrap="square" lIns="91425" tIns="91425" rIns="91425" bIns="91425" anchor="t" anchorCtr="0">
-            <a:normAutofit fontScale="92500" lnSpcReduction="10000"/>
+            <a:normAutofit fontScale="92500"/>
           </a:bodyPr>
           <a:lstStyle/>
           <a:p>
@@ -7568,10 +7568,10 @@
               <a:buChar char="●"/>
             </a:pPr>
             <a:r>
-              <a:rPr lang="en"/>
+              <a:rPr lang="en" dirty="0"/>
               <a:t>Covers the period Jan - Dec 2017</a:t>
             </a:r>
-            <a:endParaRPr/>
+            <a:endParaRPr dirty="0"/>
           </a:p>
           <a:p>
             <a:pPr marL="0" lvl="0" indent="0" algn="l" rtl="0">
@@ -7583,7 +7583,7 @@
               </a:spcAft>
               <a:buNone/>
             </a:pPr>
-            <a:endParaRPr sz="651"/>
+            <a:endParaRPr sz="651" dirty="0"/>
           </a:p>
           <a:p>
             <a:pPr marL="457200" lvl="0" indent="-342900" algn="l" rtl="0">
@@ -7597,10 +7597,10 @@
               <a:buChar char="●"/>
             </a:pPr>
             <a:r>
-              <a:rPr lang="en"/>
-              <a:t>A departure is classed as delayed if the actual departure time is 15 minutes or more later than the scheduled time</a:t>
+              <a:rPr lang="en" dirty="0"/>
+              <a:t>Delayed departure = 15 minutes or more late</a:t>
             </a:r>
-            <a:endParaRPr/>
+            <a:endParaRPr dirty="0"/>
           </a:p>
           <a:p>
             <a:pPr marL="0" lvl="0" indent="0" algn="l" rtl="0">
@@ -7612,7 +7612,7 @@
               </a:spcAft>
               <a:buNone/>
             </a:pPr>
-            <a:endParaRPr sz="671"/>
+            <a:endParaRPr sz="671" dirty="0"/>
           </a:p>
           <a:p>
             <a:pPr marL="457200" lvl="0" indent="-342900" algn="l" rtl="0">
@@ -7626,10 +7626,10 @@
               <a:buChar char="●"/>
             </a:pPr>
             <a:r>
-              <a:rPr lang="en"/>
+              <a:rPr lang="en" dirty="0"/>
               <a:t>Includes data for three New York airports:</a:t>
             </a:r>
-            <a:endParaRPr/>
+            <a:endParaRPr dirty="0"/>
           </a:p>
           <a:p>
             <a:pPr marL="457200" lvl="0" indent="0" algn="l" rtl="0">
@@ -7642,14 +7642,14 @@
               <a:buNone/>
             </a:pPr>
             <a:r>
-              <a:rPr lang="en" sz="1482" b="1">
+              <a:rPr lang="en" sz="1482" b="1" dirty="0">
                 <a:solidFill>
                   <a:srgbClr val="000000"/>
                 </a:solidFill>
               </a:rPr>
               <a:t>EWR - Newark Liberty International Airport</a:t>
             </a:r>
-            <a:endParaRPr sz="1482" b="1">
+            <a:endParaRPr sz="1482" b="1" dirty="0">
               <a:solidFill>
                 <a:srgbClr val="000000"/>
               </a:solidFill>
@@ -7666,14 +7666,14 @@
               <a:buNone/>
             </a:pPr>
             <a:r>
-              <a:rPr lang="en" sz="1482" b="1">
+              <a:rPr lang="en" sz="1482" b="1" dirty="0">
                 <a:solidFill>
                   <a:srgbClr val="000000"/>
                 </a:solidFill>
               </a:rPr>
               <a:t>JFK  -  John F Kennedy International Airport</a:t>
             </a:r>
-            <a:endParaRPr sz="1482" b="1">
+            <a:endParaRPr sz="1482" b="1" dirty="0">
               <a:solidFill>
                 <a:srgbClr val="000000"/>
               </a:solidFill>
@@ -7690,14 +7690,14 @@
               <a:buNone/>
             </a:pPr>
             <a:r>
-              <a:rPr lang="en" sz="1482" b="1">
+              <a:rPr lang="en" sz="1482" b="1" dirty="0">
                 <a:solidFill>
                   <a:srgbClr val="000000"/>
                 </a:solidFill>
               </a:rPr>
               <a:t>LGA - La Guardia Airport</a:t>
             </a:r>
-            <a:endParaRPr sz="1482" b="1">
+            <a:endParaRPr sz="1482" b="1" dirty="0">
               <a:solidFill>
                 <a:srgbClr val="000000"/>
               </a:solidFill>
@@ -7715,10 +7715,10 @@
               <a:buChar char="●"/>
             </a:pPr>
             <a:r>
-              <a:rPr lang="en"/>
+              <a:rPr lang="en" dirty="0"/>
               <a:t>A full report with more detail is available to accompany this presentation</a:t>
             </a:r>
-            <a:endParaRPr/>
+            <a:endParaRPr dirty="0"/>
           </a:p>
         </p:txBody>
       </p:sp>
@@ -8339,7 +8339,7 @@
         </p:nvSpPr>
         <p:spPr>
           <a:xfrm>
-            <a:off x="311700" y="445025"/>
+            <a:off x="311700" y="290825"/>
             <a:ext cx="8520600" cy="707400"/>
           </a:xfrm>
           <a:prstGeom prst="rect">
@@ -8365,14 +8365,14 @@
               <a:buNone/>
             </a:pPr>
             <a:r>
-              <a:rPr lang="en" sz="3583">
+              <a:rPr lang="en" sz="3583" dirty="0">
                 <a:highlight>
                   <a:srgbClr val="FFFFFF"/>
                 </a:highlight>
               </a:rPr>
               <a:t>Which factors have an impact on flight delays?</a:t>
             </a:r>
-            <a:endParaRPr sz="3583">
+            <a:endParaRPr sz="3583" dirty="0">
               <a:highlight>
                 <a:srgbClr val="FFFFFF"/>
               </a:highlight>
@@ -8388,7 +8388,7 @@
               </a:spcAft>
               <a:buNone/>
             </a:pPr>
-            <a:endParaRPr/>
+            <a:endParaRPr dirty="0"/>
           </a:p>
         </p:txBody>
       </p:sp>
@@ -8427,10 +8427,10 @@
               <a:buNone/>
             </a:pPr>
             <a:r>
-              <a:rPr lang="en"/>
+              <a:rPr lang="en" dirty="0"/>
               <a:t>Analysis of the available data showed that the following are statistically significant:</a:t>
             </a:r>
-            <a:endParaRPr/>
+            <a:endParaRPr dirty="0"/>
           </a:p>
           <a:p>
             <a:pPr marL="0" lvl="0" indent="0" algn="l" rtl="0">
@@ -8442,7 +8442,7 @@
               </a:spcAft>
               <a:buNone/>
             </a:pPr>
-            <a:endParaRPr sz="651"/>
+            <a:endParaRPr sz="651" dirty="0"/>
           </a:p>
           <a:p>
             <a:pPr marL="457200" lvl="0" indent="-318534" algn="l" rtl="0">
@@ -8459,7 +8459,7 @@
               <a:buChar char="●"/>
             </a:pPr>
             <a:r>
-              <a:rPr lang="en" sz="1666">
+              <a:rPr lang="en" sz="1666" dirty="0">
                 <a:solidFill>
                   <a:srgbClr val="333333"/>
                 </a:solidFill>
@@ -8469,7 +8469,7 @@
               </a:rPr>
               <a:t>number of departures in scheduled departure hour</a:t>
             </a:r>
-            <a:endParaRPr sz="1666">
+            <a:endParaRPr sz="1666" dirty="0">
               <a:solidFill>
                 <a:srgbClr val="333333"/>
               </a:solidFill>
@@ -8493,7 +8493,7 @@
               <a:buChar char="●"/>
             </a:pPr>
             <a:r>
-              <a:rPr lang="en" sz="1666">
+              <a:rPr lang="en" sz="1666" dirty="0">
                 <a:solidFill>
                   <a:srgbClr val="333333"/>
                 </a:solidFill>
@@ -8503,7 +8503,7 @@
               </a:rPr>
               <a:t>visibility (miles)</a:t>
             </a:r>
-            <a:endParaRPr sz="1666">
+            <a:endParaRPr sz="1666" dirty="0">
               <a:solidFill>
                 <a:srgbClr val="333333"/>
               </a:solidFill>
@@ -8527,7 +8527,7 @@
               <a:buChar char="●"/>
             </a:pPr>
             <a:r>
-              <a:rPr lang="en" sz="1666">
+              <a:rPr lang="en" sz="1666" dirty="0">
                 <a:solidFill>
                   <a:srgbClr val="333333"/>
                 </a:solidFill>
@@ -8537,7 +8537,7 @@
               </a:rPr>
               <a:t>wind speed (mph)</a:t>
             </a:r>
-            <a:endParaRPr sz="1666">
+            <a:endParaRPr sz="1666" dirty="0">
               <a:solidFill>
                 <a:srgbClr val="333333"/>
               </a:solidFill>
@@ -8561,7 +8561,7 @@
               <a:buChar char="●"/>
             </a:pPr>
             <a:r>
-              <a:rPr lang="en" sz="1666">
+              <a:rPr lang="en" sz="1666" dirty="0">
                 <a:solidFill>
                   <a:srgbClr val="333333"/>
                 </a:solidFill>
@@ -8571,7 +8571,7 @@
               </a:rPr>
               <a:t>wind direction cardinal (N, S, E, W)</a:t>
             </a:r>
-            <a:endParaRPr sz="1666">
+            <a:endParaRPr sz="1666" dirty="0">
               <a:solidFill>
                 <a:srgbClr val="333333"/>
               </a:solidFill>
@@ -8595,7 +8595,7 @@
               <a:buChar char="●"/>
             </a:pPr>
             <a:r>
-              <a:rPr lang="en" sz="1666">
+              <a:rPr lang="en" sz="1666" dirty="0">
                 <a:solidFill>
                   <a:srgbClr val="333333"/>
                 </a:solidFill>
@@ -8605,7 +8605,7 @@
               </a:rPr>
               <a:t>precipitation daily total (inches)</a:t>
             </a:r>
-            <a:endParaRPr sz="1666">
+            <a:endParaRPr sz="1666" dirty="0">
               <a:solidFill>
                 <a:srgbClr val="333333"/>
               </a:solidFill>
@@ -8629,7 +8629,7 @@
               <a:buChar char="●"/>
             </a:pPr>
             <a:r>
-              <a:rPr lang="en" sz="1666">
+              <a:rPr lang="en" sz="1666" dirty="0">
                 <a:solidFill>
                   <a:srgbClr val="333333"/>
                 </a:solidFill>
@@ -8639,7 +8639,7 @@
               </a:rPr>
               <a:t>snowfall daily total (inches)</a:t>
             </a:r>
-            <a:endParaRPr sz="1666">
+            <a:endParaRPr sz="1666" dirty="0">
               <a:solidFill>
                 <a:srgbClr val="333333"/>
               </a:solidFill>
@@ -8663,7 +8663,7 @@
               <a:buChar char="●"/>
             </a:pPr>
             <a:r>
-              <a:rPr lang="en" sz="1666">
+              <a:rPr lang="en" sz="1666" dirty="0">
                 <a:solidFill>
                   <a:srgbClr val="333333"/>
                 </a:solidFill>
@@ -8673,7 +8673,7 @@
               </a:rPr>
               <a:t>temperature daily maximum (Fahrenheit)</a:t>
             </a:r>
-            <a:endParaRPr sz="1666">
+            <a:endParaRPr sz="1666" dirty="0">
               <a:solidFill>
                 <a:srgbClr val="333333"/>
               </a:solidFill>
@@ -8692,7 +8692,7 @@
               </a:spcAft>
               <a:buNone/>
             </a:pPr>
-            <a:endParaRPr sz="1450">
+            <a:endParaRPr sz="1450" dirty="0">
               <a:solidFill>
                 <a:srgbClr val="333333"/>
               </a:solidFill>
@@ -8712,10 +8712,10 @@
               <a:buNone/>
             </a:pPr>
             <a:r>
-              <a:rPr lang="en"/>
+              <a:rPr lang="en" dirty="0"/>
               <a:t>Note only one of these is a non-weather factor </a:t>
             </a:r>
-            <a:endParaRPr/>
+            <a:endParaRPr dirty="0"/>
           </a:p>
           <a:p>
             <a:pPr marL="0" lvl="0" indent="0" algn="l" rtl="0">
@@ -8728,10 +8728,10 @@
               <a:buNone/>
             </a:pPr>
             <a:r>
-              <a:rPr lang="en"/>
+              <a:rPr lang="en" dirty="0"/>
               <a:t>Modeling produced similar results with and without this variable</a:t>
             </a:r>
-            <a:endParaRPr/>
+            <a:endParaRPr dirty="0"/>
           </a:p>
           <a:p>
             <a:pPr marL="0" lvl="0" indent="0" algn="l" rtl="0">
@@ -8743,7 +8743,7 @@
               </a:spcAft>
               <a:buNone/>
             </a:pPr>
-            <a:endParaRPr sz="1450">
+            <a:endParaRPr sz="1450" dirty="0">
               <a:solidFill>
                 <a:srgbClr val="333333"/>
               </a:solidFill>
@@ -8865,7 +8865,7 @@
         </p:spPr>
         <p:txBody>
           <a:bodyPr spcFirstLastPara="1" wrap="square" lIns="91425" tIns="91425" rIns="91425" bIns="91425" anchor="t" anchorCtr="0">
-            <a:normAutofit fontScale="85000" lnSpcReduction="20000"/>
+            <a:normAutofit/>
           </a:bodyPr>
           <a:lstStyle/>
           <a:p>
@@ -8879,10 +8879,10 @@
               <a:buNone/>
             </a:pPr>
             <a:r>
-              <a:rPr lang="en"/>
-              <a:t>Other sources show the importance of the knock-on effect of a plane arriving late from an earlier flight - it has not been possible to include this factor in this analysis</a:t>
+              <a:rPr lang="en" dirty="0"/>
+              <a:t>Other reports show delays to previous flights are a factor</a:t>
             </a:r>
-            <a:endParaRPr sz="1450">
+            <a:endParaRPr sz="1450" dirty="0">
               <a:solidFill>
                 <a:srgbClr val="333333"/>
               </a:solidFill>
@@ -8984,14 +8984,14 @@
               <a:buNone/>
             </a:pPr>
             <a:r>
-              <a:rPr lang="en" sz="3583">
+              <a:rPr lang="en" sz="3583" dirty="0">
                 <a:highlight>
                   <a:srgbClr val="FFFFFF"/>
                 </a:highlight>
               </a:rPr>
               <a:t>Conclusions and next steps</a:t>
             </a:r>
-            <a:endParaRPr sz="3583">
+            <a:endParaRPr sz="3583" dirty="0">
               <a:highlight>
                 <a:srgbClr val="FFFFFF"/>
               </a:highlight>
@@ -9007,7 +9007,7 @@
               </a:spcAft>
               <a:buNone/>
             </a:pPr>
-            <a:endParaRPr/>
+            <a:endParaRPr dirty="0"/>
           </a:p>
         </p:txBody>
       </p:sp>
@@ -9045,7 +9045,7 @@
               </a:spcAft>
               <a:buNone/>
             </a:pPr>
-            <a:endParaRPr/>
+            <a:endParaRPr dirty="0"/>
           </a:p>
           <a:p>
             <a:pPr marL="0" lvl="0" indent="0" algn="l" rtl="0">
@@ -9058,7 +9058,7 @@
               <a:buNone/>
             </a:pPr>
             <a:r>
-              <a:rPr lang="en" sz="1666">
+              <a:rPr lang="en" sz="1666" dirty="0">
                 <a:solidFill>
                   <a:srgbClr val="333333"/>
                 </a:solidFill>
@@ -9068,7 +9068,7 @@
               </a:rPr>
               <a:t>A number of weather variables have a significant effect on delayed departures</a:t>
             </a:r>
-            <a:endParaRPr sz="1666">
+            <a:endParaRPr sz="1666" dirty="0">
               <a:solidFill>
                 <a:srgbClr val="333333"/>
               </a:solidFill>
@@ -9087,7 +9087,7 @@
               </a:spcAft>
               <a:buNone/>
             </a:pPr>
-            <a:endParaRPr sz="1666">
+            <a:endParaRPr sz="1666" dirty="0">
               <a:solidFill>
                 <a:srgbClr val="333333"/>
               </a:solidFill>
@@ -9107,7 +9107,7 @@
               <a:buNone/>
             </a:pPr>
             <a:r>
-              <a:rPr lang="en" sz="1666">
+              <a:rPr lang="en" sz="1666" dirty="0">
                 <a:solidFill>
                   <a:srgbClr val="333333"/>
                 </a:solidFill>
@@ -9117,7 +9117,7 @@
               </a:rPr>
               <a:t>The number of flights leaving in the scheduled hour of departure is also significant</a:t>
             </a:r>
-            <a:endParaRPr sz="1666">
+            <a:endParaRPr sz="1666" dirty="0">
               <a:solidFill>
                 <a:srgbClr val="333333"/>
               </a:solidFill>
@@ -9136,7 +9136,7 @@
               </a:spcAft>
               <a:buNone/>
             </a:pPr>
-            <a:endParaRPr sz="1666">
+            <a:endParaRPr sz="1666" dirty="0">
               <a:solidFill>
                 <a:srgbClr val="333333"/>
               </a:solidFill>
@@ -9156,7 +9156,7 @@
               <a:buNone/>
             </a:pPr>
             <a:r>
-              <a:rPr lang="en" sz="1666">
+              <a:rPr lang="en" sz="1666" dirty="0">
                 <a:solidFill>
                   <a:srgbClr val="333333"/>
                 </a:solidFill>
@@ -9167,7 +9167,7 @@
               <a:t>However, the data which was in scope for this report </a:t>
             </a:r>
             <a:r>
-              <a:rPr lang="en" sz="1666" b="1">
+              <a:rPr lang="en" sz="1666" b="1" dirty="0">
                 <a:solidFill>
                   <a:srgbClr val="333333"/>
                 </a:solidFill>
@@ -9178,7 +9178,7 @@
               <a:t>is not sufficient  to make business decisions </a:t>
             </a:r>
             <a:r>
-              <a:rPr lang="en" sz="1666">
+              <a:rPr lang="en" sz="1666" dirty="0">
                 <a:solidFill>
                   <a:srgbClr val="333333"/>
                 </a:solidFill>
@@ -9186,9 +9186,9 @@
                   <a:srgbClr val="FFFFFF"/>
                 </a:highlight>
               </a:rPr>
-              <a:t>on future investment at Newark - important factors (such as the knock-on effect of earlier flight delays) were not in scope</a:t>
+              <a:t>on future investment at Newark - important factors (such as the knock-on effect of earlier flight delays) could not be assessed</a:t>
             </a:r>
-            <a:endParaRPr sz="1666">
+            <a:endParaRPr sz="1666" dirty="0">
               <a:solidFill>
                 <a:srgbClr val="333333"/>
               </a:solidFill>
@@ -9207,7 +9207,7 @@
               </a:spcAft>
               <a:buNone/>
             </a:pPr>
-            <a:endParaRPr sz="1666">
+            <a:endParaRPr sz="1666" dirty="0">
               <a:solidFill>
                 <a:srgbClr val="333333"/>
               </a:solidFill>
@@ -9227,7 +9227,7 @@
               <a:buNone/>
             </a:pPr>
             <a:r>
-              <a:rPr lang="en" sz="1666">
+              <a:rPr lang="en" sz="1666" dirty="0">
                 <a:solidFill>
                   <a:srgbClr val="333333"/>
                 </a:solidFill>
@@ -9237,7 +9237,7 @@
               </a:rPr>
               <a:t>Further analysis required - perhaps using reporting on causes of delays collated by the US Bureau of Transportation Statistics since 2003:</a:t>
             </a:r>
-            <a:endParaRPr sz="1666">
+            <a:endParaRPr sz="1666" dirty="0">
               <a:solidFill>
                 <a:srgbClr val="333333"/>
               </a:solidFill>
@@ -9257,17 +9257,37 @@
               <a:buNone/>
             </a:pPr>
             <a:r>
-              <a:rPr lang="en" sz="1666">
+              <a:rPr lang="en" sz="1666" dirty="0">
                 <a:solidFill>
                   <a:srgbClr val="333333"/>
                 </a:solidFill>
                 <a:highlight>
                   <a:srgbClr val="FFFFFF"/>
                 </a:highlight>
+                <a:hlinkClick r:id="rId3"/>
               </a:rPr>
               <a:t>https://www.transtats.bts.gov/OT_Delay/OT_DelayCause1.asp</a:t>
             </a:r>
-            <a:endParaRPr sz="1450">
+            <a:endParaRPr lang="en" sz="1666" dirty="0">
+              <a:solidFill>
+                <a:srgbClr val="333333"/>
+              </a:solidFill>
+              <a:highlight>
+                <a:srgbClr val="FFFFFF"/>
+              </a:highlight>
+            </a:endParaRPr>
+          </a:p>
+          <a:p>
+            <a:pPr marL="0" lvl="0" indent="0" algn="l" rtl="0">
+              <a:spcBef>
+                <a:spcPts val="800"/>
+              </a:spcBef>
+              <a:spcAft>
+                <a:spcPts val="800"/>
+              </a:spcAft>
+              <a:buNone/>
+            </a:pPr>
+            <a:endParaRPr sz="1450" dirty="0">
               <a:solidFill>
                 <a:srgbClr val="333333"/>
               </a:solidFill>

</xml_diff>

<commit_message>
presentation updated with data sources diagram
</commit_message>
<xml_diff>
--- a/documentation/presentation.pptx
+++ b/documentation/presentation.pptx
@@ -8523,45 +8523,19 @@
               </a:spcAft>
               <a:buNone/>
             </a:pPr>
-            <a:endParaRPr sz="651"/>
-          </a:p>
-          <a:p>
-            <a:pPr marL="457200" lvl="0" indent="-334404" algn="l" rtl="0">
-              <a:spcBef>
-                <a:spcPts val="1200"/>
-              </a:spcBef>
-              <a:spcAft>
-                <a:spcPts val="0"/>
-              </a:spcAft>
-              <a:buClr>
-                <a:srgbClr val="333333"/>
-              </a:buClr>
-              <a:buSzPts val="1666"/>
-              <a:buChar char="●"/>
+            <a:endParaRPr sz="651" dirty="0"/>
+          </a:p>
+          <a:p>
+            <a:pPr marL="0" lvl="0" indent="0" algn="l" rtl="0">
+              <a:spcBef>
+                <a:spcPts val="800"/>
+              </a:spcBef>
+              <a:spcAft>
+                <a:spcPts val="800"/>
+              </a:spcAft>
+              <a:buNone/>
             </a:pPr>
-            <a:r>
-              <a:rPr lang="en" sz="1666" b="1">
-                <a:solidFill>
-                  <a:srgbClr val="333333"/>
-                </a:solidFill>
-                <a:highlight>
-                  <a:srgbClr val="FFFFFF"/>
-                </a:highlight>
-              </a:rPr>
-              <a:t>Flight data</a:t>
-            </a:r>
-            <a:r>
-              <a:rPr lang="en" sz="1666">
-                <a:solidFill>
-                  <a:srgbClr val="333333"/>
-                </a:solidFill>
-                <a:highlight>
-                  <a:srgbClr val="FFFFFF"/>
-                </a:highlight>
-              </a:rPr>
-              <a:t> including departure date and time, carrier, destination</a:t>
-            </a:r>
-            <a:endParaRPr sz="1666">
+            <a:endParaRPr sz="1450" dirty="0">
               <a:solidFill>
                 <a:srgbClr val="333333"/>
               </a:solidFill>
@@ -8570,241 +8544,38 @@
               </a:highlight>
             </a:endParaRPr>
           </a:p>
-          <a:p>
-            <a:pPr marL="0" lvl="0" indent="0" algn="l" rtl="0">
-              <a:spcBef>
-                <a:spcPts val="800"/>
-              </a:spcBef>
-              <a:spcAft>
-                <a:spcPts val="0"/>
-              </a:spcAft>
-              <a:buNone/>
-            </a:pPr>
-            <a:endParaRPr sz="1666">
-              <a:solidFill>
-                <a:srgbClr val="333333"/>
-              </a:solidFill>
-              <a:highlight>
-                <a:srgbClr val="FFFFFF"/>
-              </a:highlight>
-            </a:endParaRPr>
-          </a:p>
-          <a:p>
-            <a:pPr marL="457200" lvl="0" indent="-334404" algn="l" rtl="0">
-              <a:spcBef>
-                <a:spcPts val="800"/>
-              </a:spcBef>
-              <a:spcAft>
-                <a:spcPts val="0"/>
-              </a:spcAft>
-              <a:buClr>
-                <a:srgbClr val="333333"/>
-              </a:buClr>
-              <a:buSzPts val="1666"/>
-              <a:buChar char="●"/>
-            </a:pPr>
-            <a:r>
-              <a:rPr lang="en" sz="1666" b="1">
-                <a:solidFill>
-                  <a:srgbClr val="333333"/>
-                </a:solidFill>
-                <a:highlight>
-                  <a:srgbClr val="FFFFFF"/>
-                </a:highlight>
-              </a:rPr>
-              <a:t>Weather</a:t>
-            </a:r>
-            <a:r>
-              <a:rPr lang="en" sz="1666">
-                <a:solidFill>
-                  <a:srgbClr val="333333"/>
-                </a:solidFill>
-                <a:highlight>
-                  <a:srgbClr val="FFFFFF"/>
-                </a:highlight>
-              </a:rPr>
-              <a:t> </a:t>
-            </a:r>
-            <a:r>
-              <a:rPr lang="en" sz="1666" b="1">
-                <a:solidFill>
-                  <a:srgbClr val="333333"/>
-                </a:solidFill>
-                <a:highlight>
-                  <a:srgbClr val="FFFFFF"/>
-                </a:highlight>
-              </a:rPr>
-              <a:t>data</a:t>
-            </a:r>
-            <a:r>
-              <a:rPr lang="en" sz="1666">
-                <a:solidFill>
-                  <a:srgbClr val="333333"/>
-                </a:solidFill>
-                <a:highlight>
-                  <a:srgbClr val="FFFFFF"/>
-                </a:highlight>
-              </a:rPr>
-              <a:t> including temperature, precipitation, snowfall, wind speed/direction, visibility</a:t>
-            </a:r>
-            <a:endParaRPr sz="1666">
-              <a:solidFill>
-                <a:srgbClr val="333333"/>
-              </a:solidFill>
-              <a:highlight>
-                <a:srgbClr val="FFFFFF"/>
-              </a:highlight>
-            </a:endParaRPr>
-          </a:p>
-          <a:p>
-            <a:pPr marL="457200" lvl="0" indent="0" algn="l" rtl="0">
-              <a:spcBef>
-                <a:spcPts val="800"/>
-              </a:spcBef>
-              <a:spcAft>
-                <a:spcPts val="0"/>
-              </a:spcAft>
-              <a:buNone/>
-            </a:pPr>
-            <a:endParaRPr sz="1666">
-              <a:solidFill>
-                <a:srgbClr val="333333"/>
-              </a:solidFill>
-              <a:highlight>
-                <a:srgbClr val="FFFFFF"/>
-              </a:highlight>
-            </a:endParaRPr>
-          </a:p>
-          <a:p>
-            <a:pPr marL="457200" lvl="0" indent="-334404" algn="l" rtl="0">
-              <a:spcBef>
-                <a:spcPts val="800"/>
-              </a:spcBef>
-              <a:spcAft>
-                <a:spcPts val="0"/>
-              </a:spcAft>
-              <a:buClr>
-                <a:srgbClr val="333333"/>
-              </a:buClr>
-              <a:buSzPts val="1666"/>
-              <a:buChar char="●"/>
-            </a:pPr>
-            <a:r>
-              <a:rPr lang="en" sz="1666" b="1">
-                <a:solidFill>
-                  <a:srgbClr val="333333"/>
-                </a:solidFill>
-                <a:highlight>
-                  <a:srgbClr val="FFFFFF"/>
-                </a:highlight>
-              </a:rPr>
-              <a:t>Aircraft data</a:t>
-            </a:r>
-            <a:r>
-              <a:rPr lang="en" sz="1666">
-                <a:solidFill>
-                  <a:srgbClr val="333333"/>
-                </a:solidFill>
-                <a:highlight>
-                  <a:srgbClr val="FFFFFF"/>
-                </a:highlight>
-              </a:rPr>
-              <a:t> including manufacturer, type and model</a:t>
-            </a:r>
-            <a:endParaRPr sz="1666">
-              <a:solidFill>
-                <a:srgbClr val="333333"/>
-              </a:solidFill>
-              <a:highlight>
-                <a:srgbClr val="FFFFFF"/>
-              </a:highlight>
-            </a:endParaRPr>
-          </a:p>
-          <a:p>
-            <a:pPr marL="0" lvl="0" indent="0" algn="l" rtl="0">
-              <a:spcBef>
-                <a:spcPts val="800"/>
-              </a:spcBef>
-              <a:spcAft>
-                <a:spcPts val="0"/>
-              </a:spcAft>
-              <a:buNone/>
-            </a:pPr>
-            <a:endParaRPr sz="1666">
-              <a:solidFill>
-                <a:srgbClr val="333333"/>
-              </a:solidFill>
-              <a:highlight>
-                <a:srgbClr val="FFFFFF"/>
-              </a:highlight>
-            </a:endParaRPr>
-          </a:p>
-          <a:p>
-            <a:pPr marL="457200" lvl="0" indent="-334404" algn="l" rtl="0">
-              <a:spcBef>
-                <a:spcPts val="800"/>
-              </a:spcBef>
-              <a:spcAft>
-                <a:spcPts val="0"/>
-              </a:spcAft>
-              <a:buClr>
-                <a:srgbClr val="333333"/>
-              </a:buClr>
-              <a:buSzPts val="1666"/>
-              <a:buChar char="●"/>
-            </a:pPr>
-            <a:r>
-              <a:rPr lang="en" sz="1666" b="1">
-                <a:solidFill>
-                  <a:srgbClr val="333333"/>
-                </a:solidFill>
-                <a:highlight>
-                  <a:srgbClr val="FFFFFF"/>
-                </a:highlight>
-              </a:rPr>
-              <a:t>Airport data</a:t>
-            </a:r>
-            <a:r>
-              <a:rPr lang="en" sz="1666">
-                <a:solidFill>
-                  <a:srgbClr val="333333"/>
-                </a:solidFill>
-                <a:highlight>
-                  <a:srgbClr val="FFFFFF"/>
-                </a:highlight>
-              </a:rPr>
-              <a:t> - latitude and longitude of destination</a:t>
-            </a:r>
-            <a:endParaRPr sz="1666">
-              <a:solidFill>
-                <a:srgbClr val="333333"/>
-              </a:solidFill>
-              <a:highlight>
-                <a:srgbClr val="FFFFFF"/>
-              </a:highlight>
-            </a:endParaRPr>
-          </a:p>
-          <a:p>
-            <a:pPr marL="0" lvl="0" indent="0" algn="l" rtl="0">
-              <a:spcBef>
-                <a:spcPts val="800"/>
-              </a:spcBef>
-              <a:spcAft>
-                <a:spcPts val="800"/>
-              </a:spcAft>
-              <a:buNone/>
-            </a:pPr>
-            <a:endParaRPr sz="1450">
-              <a:solidFill>
-                <a:srgbClr val="333333"/>
-              </a:solidFill>
-              <a:highlight>
-                <a:srgbClr val="FFFFFF"/>
-              </a:highlight>
-            </a:endParaRPr>
-          </a:p>
         </p:txBody>
       </p:sp>
+      <p:pic>
+        <p:nvPicPr>
+          <p:cNvPr id="3" name="Picture 2" descr="Diagram&#10;&#10;Description automatically generated">
+            <a:extLst>
+              <a:ext uri="{FF2B5EF4-FFF2-40B4-BE49-F238E27FC236}">
+                <a16:creationId xmlns:a16="http://schemas.microsoft.com/office/drawing/2014/main" id="{3924D71E-640B-D841-BAE0-F8D1093B1773}"/>
+              </a:ext>
+            </a:extLst>
+          </p:cNvPr>
+          <p:cNvPicPr>
+            <a:picLocks noChangeAspect="1"/>
+          </p:cNvPicPr>
+          <p:nvPr/>
+        </p:nvPicPr>
+        <p:blipFill>
+          <a:blip r:embed="rId3"/>
+          <a:stretch>
+            <a:fillRect/>
+          </a:stretch>
+        </p:blipFill>
+        <p:spPr>
+          <a:xfrm>
+            <a:off x="492979" y="1257508"/>
+            <a:ext cx="6575729" cy="3490134"/>
+          </a:xfrm>
+          <a:prstGeom prst="rect">
+            <a:avLst/>
+          </a:prstGeom>
+        </p:spPr>
+      </p:pic>
     </p:spTree>
   </p:cSld>
   <p:clrMapOvr>

</xml_diff>